<commit_message>
Versao 2 do Kickoff com fundo rosa fiap
</commit_message>
<xml_diff>
--- a/PastaoDocumentos/Kickoff.pptx
+++ b/PastaoDocumentos/Kickoff.pptx
@@ -104,6 +104,11 @@
       </a:defRPr>
     </a:lvl9pPr>
   </p:defaultTextStyle>
+  <p:extLst>
+    <p:ext uri="{EFAFB233-063F-42B5-8137-9DF3F51BA10A}">
+      <p15:sldGuideLst xmlns:p15="http://schemas.microsoft.com/office/powerpoint/2012/main"/>
+    </p:ext>
+  </p:extLst>
 </p:presentation>
 </file>
 
@@ -3323,6 +3328,55 @@
       </p:grpSpPr>
       <p:sp>
         <p:nvSpPr>
+          <p:cNvPr id="4" name="Rectangle: Rounded Corners 3">
+            <a:extLst>
+              <a:ext uri="{FF2B5EF4-FFF2-40B4-BE49-F238E27FC236}">
+                <a16:creationId xmlns:a16="http://schemas.microsoft.com/office/drawing/2014/main" id="{BB037ED8-6F55-4610-9C97-8784E691FC1B}"/>
+              </a:ext>
+            </a:extLst>
+          </p:cNvPr>
+          <p:cNvSpPr/>
+          <p:nvPr/>
+        </p:nvSpPr>
+        <p:spPr>
+          <a:xfrm>
+            <a:off x="4485249" y="2247314"/>
+            <a:ext cx="3221502" cy="1856935"/>
+          </a:xfrm>
+          <a:prstGeom prst="roundRect">
+            <a:avLst/>
+          </a:prstGeom>
+          <a:solidFill>
+            <a:srgbClr val="FA0E41"/>
+          </a:solidFill>
+        </p:spPr>
+        <p:style>
+          <a:lnRef idx="2">
+            <a:schemeClr val="accent1">
+              <a:shade val="50000"/>
+            </a:schemeClr>
+          </a:lnRef>
+          <a:fillRef idx="1">
+            <a:schemeClr val="accent1"/>
+          </a:fillRef>
+          <a:effectRef idx="0">
+            <a:schemeClr val="accent1"/>
+          </a:effectRef>
+          <a:fontRef idx="minor">
+            <a:schemeClr val="lt1"/>
+          </a:fontRef>
+        </p:style>
+        <p:txBody>
+          <a:bodyPr rtlCol="0" anchor="ctr"/>
+          <a:lstStyle/>
+          <a:p>
+            <a:pPr algn="ctr"/>
+            <a:endParaRPr lang="en-US"/>
+          </a:p>
+        </p:txBody>
+      </p:sp>
+      <p:sp>
+        <p:nvSpPr>
           <p:cNvPr id="2" name="Title 1">
             <a:extLst>
               <a:ext uri="{FF2B5EF4-FFF2-40B4-BE49-F238E27FC236}">
@@ -3337,7 +3391,12 @@
             <p:ph type="ctrTitle"/>
           </p:nvPr>
         </p:nvSpPr>
-        <p:spPr/>
+        <p:spPr>
+          <a:xfrm>
+            <a:off x="1524000" y="1214438"/>
+            <a:ext cx="9144000" cy="2387600"/>
+          </a:xfrm>
+        </p:spPr>
         <p:txBody>
           <a:bodyPr/>
           <a:lstStyle/>
@@ -3347,31 +3406,6 @@
               <a:t>Kickoff</a:t>
             </a:r>
             <a:endParaRPr lang="en-US" dirty="0"/>
-          </a:p>
-        </p:txBody>
-      </p:sp>
-      <p:sp>
-        <p:nvSpPr>
-          <p:cNvPr id="3" name="Subtitle 2">
-            <a:extLst>
-              <a:ext uri="{FF2B5EF4-FFF2-40B4-BE49-F238E27FC236}">
-                <a16:creationId xmlns:a16="http://schemas.microsoft.com/office/drawing/2014/main" id="{731949E9-9CDE-4242-A13E-1A1EE89AF2E1}"/>
-              </a:ext>
-            </a:extLst>
-          </p:cNvPr>
-          <p:cNvSpPr>
-            <a:spLocks noGrp="1"/>
-          </p:cNvSpPr>
-          <p:nvPr>
-            <p:ph type="subTitle" idx="1"/>
-          </p:nvPr>
-        </p:nvSpPr>
-        <p:spPr/>
-        <p:txBody>
-          <a:bodyPr/>
-          <a:lstStyle/>
-          <a:p>
-            <a:endParaRPr lang="en-US"/>
           </a:p>
         </p:txBody>
       </p:sp>

</xml_diff>